<commit_message>
add 2.1 on slide.
</commit_message>
<xml_diff>
--- a/TypeScript- Superheroic Power In Angular (short version).pptx
+++ b/TypeScript- Superheroic Power In Angular (short version).pptx
@@ -26346,436 +26346,395 @@
       </p:grpSpPr>
       <p:grpSp>
         <p:nvGrpSpPr>
-          <p:cNvPr id="421" name="Shape 421"/>
+          <p:cNvPr id="422" name="Shape 422"/>
           <p:cNvGrpSpPr/>
           <p:nvPr/>
         </p:nvGrpSpPr>
         <p:grpSpPr>
-          <a:xfrm rot="-1074654">
-            <a:off x="690037" y="2067340"/>
-            <a:ext cx="7451102" cy="715883"/>
-            <a:chOff x="1036637" y="5140362"/>
-            <a:chExt cx="10210500" cy="981000"/>
+          <a:xfrm rot="20525346">
+            <a:off x="810682" y="2819900"/>
+            <a:ext cx="1556774" cy="715883"/>
+            <a:chOff x="1265237" y="5140362"/>
+            <a:chExt cx="2133300" cy="981000"/>
           </a:xfrm>
         </p:grpSpPr>
-        <p:grpSp>
-          <p:nvGrpSpPr>
-            <p:cNvPr id="422" name="Shape 422"/>
-            <p:cNvGrpSpPr/>
+        <p:sp>
+          <p:nvSpPr>
+            <p:cNvPr id="423" name="Shape 423"/>
+            <p:cNvSpPr/>
             <p:nvPr/>
-          </p:nvGrpSpPr>
-          <p:grpSpPr>
+          </p:nvSpPr>
+          <p:spPr>
             <a:xfrm>
-              <a:off x="2713037" y="5140362"/>
-              <a:ext cx="2133300" cy="981000"/>
-              <a:chOff x="1265237" y="5140362"/>
-              <a:chExt cx="2133300" cy="981000"/>
+              <a:off x="1265237" y="5402262"/>
+              <a:ext cx="457200" cy="457200"/>
             </a:xfrm>
-          </p:grpSpPr>
-          <p:sp>
-            <p:nvSpPr>
-              <p:cNvPr id="423" name="Shape 423"/>
-              <p:cNvSpPr/>
-              <p:nvPr/>
-            </p:nvSpPr>
-            <p:spPr>
-              <a:xfrm>
-                <a:off x="1265237" y="5402262"/>
-                <a:ext cx="457200" cy="457200"/>
-              </a:xfrm>
-              <a:prstGeom prst="ellipse">
-                <a:avLst/>
-              </a:prstGeom>
-              <a:noFill/>
-              <a:ln w="38100" cap="flat" cmpd="sng">
-                <a:solidFill>
-                  <a:schemeClr val="dk1"/>
-                </a:solidFill>
-                <a:prstDash val="solid"/>
-                <a:round/>
-                <a:headEnd type="none" w="med" len="med"/>
-                <a:tailEnd type="none" w="med" len="med"/>
-              </a:ln>
-            </p:spPr>
-            <p:txBody>
-              <a:bodyPr lIns="182875" tIns="146300" rIns="182875" bIns="146300" anchor="t" anchorCtr="0">
-                <a:noAutofit/>
-              </a:bodyPr>
-              <a:lstStyle/>
-              <a:p>
-                <a:pPr marL="0" marR="0" lvl="0" indent="0" algn="ctr" rtl="0">
-                  <a:lnSpc>
-                    <a:spcPct val="90000"/>
-                  </a:lnSpc>
-                  <a:spcBef>
-                    <a:spcPts val="0"/>
-                  </a:spcBef>
-                  <a:spcAft>
-                    <a:spcPts val="0"/>
-                  </a:spcAft>
-                  <a:buClr>
-                    <a:schemeClr val="lt1"/>
-                  </a:buClr>
-                  <a:buFont typeface="Arial"/>
-                  <a:buNone/>
-                </a:pPr>
-                <a:endParaRPr sz="1800" b="0" i="0" u="none" strike="noStrike" cap="none">
-                  <a:solidFill>
-                    <a:srgbClr val="FFFFFF"/>
-                  </a:solidFill>
-                  <a:latin typeface="Quattrocento Sans"/>
-                  <a:ea typeface="Quattrocento Sans"/>
-                  <a:cs typeface="Quattrocento Sans"/>
-                  <a:sym typeface="Quattrocento Sans"/>
-                </a:endParaRPr>
-              </a:p>
-            </p:txBody>
-          </p:sp>
-          <p:cxnSp>
-            <p:nvCxnSpPr>
-              <p:cNvPr id="424" name="Shape 424"/>
-              <p:cNvCxnSpPr>
-                <a:stCxn id="423" idx="6"/>
-              </p:cNvCxnSpPr>
-              <p:nvPr/>
-            </p:nvCxnSpPr>
-            <p:spPr>
-              <a:xfrm rot="-9725392" flipH="1">
-                <a:off x="1762990" y="5373140"/>
-                <a:ext cx="1594993" cy="515442"/>
-              </a:xfrm>
-              <a:prstGeom prst="straightConnector1">
-                <a:avLst/>
-              </a:prstGeom>
-              <a:noFill/>
-              <a:ln w="38100" cap="flat" cmpd="sng">
-                <a:solidFill>
-                  <a:schemeClr val="dk1"/>
-                </a:solidFill>
-                <a:prstDash val="solid"/>
-                <a:round/>
-                <a:headEnd type="none" w="med" len="med"/>
-                <a:tailEnd type="triangle" w="lg" len="lg"/>
-              </a:ln>
-            </p:spPr>
-          </p:cxnSp>
-        </p:grpSp>
-        <p:grpSp>
-          <p:nvGrpSpPr>
-            <p:cNvPr id="425" name="Shape 425"/>
-            <p:cNvGrpSpPr/>
-            <p:nvPr/>
-          </p:nvGrpSpPr>
-          <p:grpSpPr>
-            <a:xfrm>
-              <a:off x="4846637" y="5140362"/>
-              <a:ext cx="2133300" cy="981000"/>
-              <a:chOff x="1265237" y="5140362"/>
-              <a:chExt cx="2133300" cy="981000"/>
-            </a:xfrm>
-          </p:grpSpPr>
-          <p:sp>
-            <p:nvSpPr>
-              <p:cNvPr id="426" name="Shape 426"/>
-              <p:cNvSpPr/>
-              <p:nvPr/>
-            </p:nvSpPr>
-            <p:spPr>
-              <a:xfrm>
-                <a:off x="1265237" y="5402262"/>
-                <a:ext cx="457200" cy="457200"/>
-              </a:xfrm>
-              <a:prstGeom prst="ellipse">
-                <a:avLst/>
-              </a:prstGeom>
-              <a:noFill/>
-              <a:ln w="38100" cap="flat" cmpd="sng">
-                <a:solidFill>
-                  <a:schemeClr val="dk1"/>
-                </a:solidFill>
-                <a:prstDash val="solid"/>
-                <a:round/>
-                <a:headEnd type="none" w="med" len="med"/>
-                <a:tailEnd type="none" w="med" len="med"/>
-              </a:ln>
-            </p:spPr>
-            <p:txBody>
-              <a:bodyPr lIns="182875" tIns="146300" rIns="182875" bIns="146300" anchor="t" anchorCtr="0">
-                <a:noAutofit/>
-              </a:bodyPr>
-              <a:lstStyle/>
-              <a:p>
-                <a:pPr marL="0" marR="0" lvl="0" indent="0" algn="ctr" rtl="0">
-                  <a:lnSpc>
-                    <a:spcPct val="90000"/>
-                  </a:lnSpc>
-                  <a:spcBef>
-                    <a:spcPts val="0"/>
-                  </a:spcBef>
-                  <a:spcAft>
-                    <a:spcPts val="0"/>
-                  </a:spcAft>
-                  <a:buClr>
-                    <a:schemeClr val="lt1"/>
-                  </a:buClr>
-                  <a:buFont typeface="Arial"/>
-                  <a:buNone/>
-                </a:pPr>
-                <a:endParaRPr sz="1800" b="0" i="0" u="none" strike="noStrike" cap="none">
-                  <a:solidFill>
-                    <a:srgbClr val="FFFFFF"/>
-                  </a:solidFill>
-                  <a:latin typeface="Quattrocento Sans"/>
-                  <a:ea typeface="Quattrocento Sans"/>
-                  <a:cs typeface="Quattrocento Sans"/>
-                  <a:sym typeface="Quattrocento Sans"/>
-                </a:endParaRPr>
-              </a:p>
-            </p:txBody>
-          </p:sp>
-          <p:cxnSp>
-            <p:nvCxnSpPr>
-              <p:cNvPr id="427" name="Shape 427"/>
-              <p:cNvCxnSpPr>
-                <a:stCxn id="426" idx="6"/>
-              </p:cNvCxnSpPr>
-              <p:nvPr/>
-            </p:nvCxnSpPr>
-            <p:spPr>
-              <a:xfrm rot="-9725392" flipH="1">
-                <a:off x="1762990" y="5373140"/>
-                <a:ext cx="1594993" cy="515442"/>
-              </a:xfrm>
-              <a:prstGeom prst="straightConnector1">
-                <a:avLst/>
-              </a:prstGeom>
-              <a:noFill/>
-              <a:ln w="38100" cap="flat" cmpd="sng">
-                <a:solidFill>
-                  <a:schemeClr val="dk1"/>
-                </a:solidFill>
-                <a:prstDash val="solid"/>
-                <a:round/>
-                <a:headEnd type="none" w="med" len="med"/>
-                <a:tailEnd type="triangle" w="lg" len="lg"/>
-              </a:ln>
-            </p:spPr>
-          </p:cxnSp>
-        </p:grpSp>
-        <p:grpSp>
-          <p:nvGrpSpPr>
-            <p:cNvPr id="428" name="Shape 428"/>
-            <p:cNvGrpSpPr/>
-            <p:nvPr/>
-          </p:nvGrpSpPr>
-          <p:grpSpPr>
-            <a:xfrm>
-              <a:off x="6980237" y="5140362"/>
-              <a:ext cx="2133300" cy="981000"/>
-              <a:chOff x="1265237" y="5140362"/>
-              <a:chExt cx="2133300" cy="981000"/>
-            </a:xfrm>
-          </p:grpSpPr>
-          <p:sp>
-            <p:nvSpPr>
-              <p:cNvPr id="429" name="Shape 429"/>
-              <p:cNvSpPr/>
-              <p:nvPr/>
-            </p:nvSpPr>
-            <p:spPr>
-              <a:xfrm>
-                <a:off x="1265237" y="5402262"/>
-                <a:ext cx="457200" cy="457200"/>
-              </a:xfrm>
-              <a:prstGeom prst="ellipse">
-                <a:avLst/>
-              </a:prstGeom>
-              <a:noFill/>
-              <a:ln w="38100" cap="flat" cmpd="sng">
-                <a:solidFill>
-                  <a:schemeClr val="dk1"/>
-                </a:solidFill>
-                <a:prstDash val="solid"/>
-                <a:round/>
-                <a:headEnd type="none" w="med" len="med"/>
-                <a:tailEnd type="none" w="med" len="med"/>
-              </a:ln>
-            </p:spPr>
-            <p:txBody>
-              <a:bodyPr lIns="182875" tIns="146300" rIns="182875" bIns="146300" anchor="t" anchorCtr="0">
-                <a:noAutofit/>
-              </a:bodyPr>
-              <a:lstStyle/>
-              <a:p>
-                <a:pPr marL="0" marR="0" lvl="0" indent="0" algn="ctr" rtl="0">
-                  <a:lnSpc>
-                    <a:spcPct val="90000"/>
-                  </a:lnSpc>
-                  <a:spcBef>
-                    <a:spcPts val="0"/>
-                  </a:spcBef>
-                  <a:spcAft>
-                    <a:spcPts val="0"/>
-                  </a:spcAft>
-                  <a:buClr>
-                    <a:schemeClr val="lt1"/>
-                  </a:buClr>
-                  <a:buFont typeface="Arial"/>
-                  <a:buNone/>
-                </a:pPr>
-                <a:endParaRPr sz="1800" b="0" i="0" u="none" strike="noStrike" cap="none">
-                  <a:solidFill>
-                    <a:srgbClr val="FFFFFF"/>
-                  </a:solidFill>
-                  <a:latin typeface="Quattrocento Sans"/>
-                  <a:ea typeface="Quattrocento Sans"/>
-                  <a:cs typeface="Quattrocento Sans"/>
-                  <a:sym typeface="Quattrocento Sans"/>
-                </a:endParaRPr>
-              </a:p>
-            </p:txBody>
-          </p:sp>
-          <p:cxnSp>
-            <p:nvCxnSpPr>
-              <p:cNvPr id="430" name="Shape 430"/>
-              <p:cNvCxnSpPr>
-                <a:stCxn id="429" idx="6"/>
-              </p:cNvCxnSpPr>
-              <p:nvPr/>
-            </p:nvCxnSpPr>
-            <p:spPr>
-              <a:xfrm rot="-9725392" flipH="1">
-                <a:off x="1762990" y="5373140"/>
-                <a:ext cx="1594993" cy="515442"/>
-              </a:xfrm>
-              <a:prstGeom prst="straightConnector1">
-                <a:avLst/>
-              </a:prstGeom>
-              <a:noFill/>
-              <a:ln w="38100" cap="flat" cmpd="sng">
-                <a:solidFill>
-                  <a:schemeClr val="dk1"/>
-                </a:solidFill>
-                <a:prstDash val="solid"/>
-                <a:round/>
-                <a:headEnd type="none" w="med" len="med"/>
-                <a:tailEnd type="triangle" w="lg" len="lg"/>
-              </a:ln>
-            </p:spPr>
-          </p:cxnSp>
-        </p:grpSp>
-        <p:grpSp>
-          <p:nvGrpSpPr>
-            <p:cNvPr id="431" name="Shape 431"/>
-            <p:cNvGrpSpPr/>
-            <p:nvPr/>
-          </p:nvGrpSpPr>
-          <p:grpSpPr>
-            <a:xfrm>
-              <a:off x="9113837" y="5140362"/>
-              <a:ext cx="2133300" cy="981000"/>
-              <a:chOff x="1265237" y="5140362"/>
-              <a:chExt cx="2133300" cy="981000"/>
-            </a:xfrm>
-          </p:grpSpPr>
-          <p:sp>
-            <p:nvSpPr>
-              <p:cNvPr id="432" name="Shape 432"/>
-              <p:cNvSpPr/>
-              <p:nvPr/>
-            </p:nvSpPr>
-            <p:spPr>
-              <a:xfrm>
-                <a:off x="1265237" y="5402262"/>
-                <a:ext cx="457200" cy="457200"/>
-              </a:xfrm>
-              <a:prstGeom prst="ellipse">
-                <a:avLst/>
-              </a:prstGeom>
-              <a:noFill/>
-              <a:ln w="38100" cap="flat" cmpd="sng">
-                <a:solidFill>
-                  <a:schemeClr val="dk1"/>
-                </a:solidFill>
-                <a:prstDash val="solid"/>
-                <a:round/>
-                <a:headEnd type="none" w="med" len="med"/>
-                <a:tailEnd type="none" w="med" len="med"/>
-              </a:ln>
-            </p:spPr>
-            <p:txBody>
-              <a:bodyPr lIns="182875" tIns="146300" rIns="182875" bIns="146300" anchor="t" anchorCtr="0">
-                <a:noAutofit/>
-              </a:bodyPr>
-              <a:lstStyle/>
-              <a:p>
-                <a:pPr marL="0" marR="0" lvl="0" indent="0" algn="ctr" rtl="0">
-                  <a:lnSpc>
-                    <a:spcPct val="90000"/>
-                  </a:lnSpc>
-                  <a:spcBef>
-                    <a:spcPts val="0"/>
-                  </a:spcBef>
-                  <a:spcAft>
-                    <a:spcPts val="0"/>
-                  </a:spcAft>
-                  <a:buClr>
-                    <a:schemeClr val="lt1"/>
-                  </a:buClr>
-                  <a:buFont typeface="Arial"/>
-                  <a:buNone/>
-                </a:pPr>
-                <a:endParaRPr sz="1800" b="0" i="0" u="none" strike="noStrike" cap="none">
-                  <a:solidFill>
-                    <a:srgbClr val="FFFFFF"/>
-                  </a:solidFill>
-                  <a:latin typeface="Quattrocento Sans"/>
-                  <a:ea typeface="Quattrocento Sans"/>
-                  <a:cs typeface="Quattrocento Sans"/>
-                  <a:sym typeface="Quattrocento Sans"/>
-                </a:endParaRPr>
-              </a:p>
-            </p:txBody>
-          </p:sp>
-          <p:cxnSp>
-            <p:nvCxnSpPr>
-              <p:cNvPr id="433" name="Shape 433"/>
-              <p:cNvCxnSpPr>
-                <a:stCxn id="432" idx="6"/>
-              </p:cNvCxnSpPr>
-              <p:nvPr/>
-            </p:nvCxnSpPr>
-            <p:spPr>
-              <a:xfrm rot="-9725392" flipH="1">
-                <a:off x="1762990" y="5373140"/>
-                <a:ext cx="1594993" cy="515442"/>
-              </a:xfrm>
-              <a:prstGeom prst="straightConnector1">
-                <a:avLst/>
-              </a:prstGeom>
-              <a:noFill/>
-              <a:ln w="38100" cap="flat" cmpd="sng">
-                <a:solidFill>
-                  <a:schemeClr val="dk1"/>
-                </a:solidFill>
-                <a:prstDash val="solid"/>
-                <a:round/>
-                <a:headEnd type="none" w="med" len="med"/>
-                <a:tailEnd type="triangle" w="lg" len="lg"/>
-              </a:ln>
-            </p:spPr>
-          </p:cxnSp>
-        </p:grpSp>
+            <a:prstGeom prst="ellipse">
+              <a:avLst/>
+            </a:prstGeom>
+            <a:noFill/>
+            <a:ln w="38100" cap="flat" cmpd="sng">
+              <a:solidFill>
+                <a:schemeClr val="dk1"/>
+              </a:solidFill>
+              <a:prstDash val="solid"/>
+              <a:round/>
+              <a:headEnd type="none" w="med" len="med"/>
+              <a:tailEnd type="none" w="med" len="med"/>
+            </a:ln>
+          </p:spPr>
+          <p:txBody>
+            <a:bodyPr lIns="182875" tIns="146300" rIns="182875" bIns="146300" anchor="t" anchorCtr="0">
+              <a:noAutofit/>
+            </a:bodyPr>
+            <a:lstStyle/>
+            <a:p>
+              <a:pPr marL="0" marR="0" lvl="0" indent="0" algn="ctr" rtl="0">
+                <a:lnSpc>
+                  <a:spcPct val="90000"/>
+                </a:lnSpc>
+                <a:spcBef>
+                  <a:spcPts val="0"/>
+                </a:spcBef>
+                <a:spcAft>
+                  <a:spcPts val="0"/>
+                </a:spcAft>
+                <a:buClr>
+                  <a:schemeClr val="lt1"/>
+                </a:buClr>
+                <a:buFont typeface="Arial"/>
+                <a:buNone/>
+              </a:pPr>
+              <a:endParaRPr sz="1800" b="0" i="0" u="none" strike="noStrike" cap="none">
+                <a:solidFill>
+                  <a:srgbClr val="FFFFFF"/>
+                </a:solidFill>
+                <a:latin typeface="Quattrocento Sans"/>
+                <a:ea typeface="Quattrocento Sans"/>
+                <a:cs typeface="Quattrocento Sans"/>
+                <a:sym typeface="Quattrocento Sans"/>
+              </a:endParaRPr>
+            </a:p>
+          </p:txBody>
+        </p:sp>
         <p:cxnSp>
           <p:nvCxnSpPr>
-            <p:cNvPr id="434" name="Shape 434"/>
-            <p:cNvCxnSpPr/>
+            <p:cNvPr id="424" name="Shape 424"/>
+            <p:cNvCxnSpPr>
+              <a:stCxn id="423" idx="6"/>
+            </p:cNvCxnSpPr>
             <p:nvPr/>
           </p:nvCxnSpPr>
           <p:spPr>
+            <a:xfrm rot="-9725392" flipH="1">
+              <a:off x="1762990" y="5373140"/>
+              <a:ext cx="1594993" cy="515442"/>
+            </a:xfrm>
+            <a:prstGeom prst="straightConnector1">
+              <a:avLst/>
+            </a:prstGeom>
+            <a:noFill/>
+            <a:ln w="38100" cap="flat" cmpd="sng">
+              <a:solidFill>
+                <a:schemeClr val="dk1"/>
+              </a:solidFill>
+              <a:prstDash val="solid"/>
+              <a:round/>
+              <a:headEnd type="none" w="med" len="med"/>
+              <a:tailEnd type="triangle" w="lg" len="lg"/>
+            </a:ln>
+          </p:spPr>
+        </p:cxnSp>
+      </p:grpSp>
+      <p:grpSp>
+        <p:nvGrpSpPr>
+          <p:cNvPr id="425" name="Shape 425"/>
+          <p:cNvGrpSpPr/>
+          <p:nvPr/>
+        </p:nvGrpSpPr>
+        <p:grpSpPr>
+          <a:xfrm rot="20525346">
+            <a:off x="2292216" y="2341067"/>
+            <a:ext cx="1556774" cy="715883"/>
+            <a:chOff x="1265237" y="5140362"/>
+            <a:chExt cx="2133300" cy="981000"/>
+          </a:xfrm>
+        </p:grpSpPr>
+        <p:sp>
+          <p:nvSpPr>
+            <p:cNvPr id="426" name="Shape 426"/>
+            <p:cNvSpPr/>
+            <p:nvPr/>
+          </p:nvSpPr>
+          <p:spPr>
             <a:xfrm>
-              <a:off x="1036637" y="5630862"/>
-              <a:ext cx="1676399" cy="0"/>
+              <a:off x="1265237" y="5402262"/>
+              <a:ext cx="457200" cy="457200"/>
+            </a:xfrm>
+            <a:prstGeom prst="ellipse">
+              <a:avLst/>
+            </a:prstGeom>
+            <a:noFill/>
+            <a:ln w="38100" cap="flat" cmpd="sng">
+              <a:solidFill>
+                <a:schemeClr val="dk1"/>
+              </a:solidFill>
+              <a:prstDash val="solid"/>
+              <a:round/>
+              <a:headEnd type="none" w="med" len="med"/>
+              <a:tailEnd type="none" w="med" len="med"/>
+            </a:ln>
+          </p:spPr>
+          <p:txBody>
+            <a:bodyPr lIns="182875" tIns="146300" rIns="182875" bIns="146300" anchor="t" anchorCtr="0">
+              <a:noAutofit/>
+            </a:bodyPr>
+            <a:lstStyle/>
+            <a:p>
+              <a:pPr marL="0" marR="0" lvl="0" indent="0" algn="ctr" rtl="0">
+                <a:lnSpc>
+                  <a:spcPct val="90000"/>
+                </a:lnSpc>
+                <a:spcBef>
+                  <a:spcPts val="0"/>
+                </a:spcBef>
+                <a:spcAft>
+                  <a:spcPts val="0"/>
+                </a:spcAft>
+                <a:buClr>
+                  <a:schemeClr val="lt1"/>
+                </a:buClr>
+                <a:buFont typeface="Arial"/>
+                <a:buNone/>
+              </a:pPr>
+              <a:endParaRPr sz="1800" b="0" i="0" u="none" strike="noStrike" cap="none">
+                <a:solidFill>
+                  <a:srgbClr val="FFFFFF"/>
+                </a:solidFill>
+                <a:latin typeface="Quattrocento Sans"/>
+                <a:ea typeface="Quattrocento Sans"/>
+                <a:cs typeface="Quattrocento Sans"/>
+                <a:sym typeface="Quattrocento Sans"/>
+              </a:endParaRPr>
+            </a:p>
+          </p:txBody>
+        </p:sp>
+        <p:cxnSp>
+          <p:nvCxnSpPr>
+            <p:cNvPr id="427" name="Shape 427"/>
+            <p:cNvCxnSpPr>
+              <a:stCxn id="426" idx="6"/>
+            </p:cNvCxnSpPr>
+            <p:nvPr/>
+          </p:nvCxnSpPr>
+          <p:spPr>
+            <a:xfrm rot="-9725392" flipH="1">
+              <a:off x="1762990" y="5373140"/>
+              <a:ext cx="1594993" cy="515442"/>
+            </a:xfrm>
+            <a:prstGeom prst="straightConnector1">
+              <a:avLst/>
+            </a:prstGeom>
+            <a:noFill/>
+            <a:ln w="38100" cap="flat" cmpd="sng">
+              <a:solidFill>
+                <a:schemeClr val="dk1"/>
+              </a:solidFill>
+              <a:prstDash val="solid"/>
+              <a:round/>
+              <a:headEnd type="none" w="med" len="med"/>
+              <a:tailEnd type="triangle" w="lg" len="lg"/>
+            </a:ln>
+          </p:spPr>
+        </p:cxnSp>
+      </p:grpSp>
+      <p:grpSp>
+        <p:nvGrpSpPr>
+          <p:cNvPr id="428" name="Shape 428"/>
+          <p:cNvGrpSpPr/>
+          <p:nvPr/>
+        </p:nvGrpSpPr>
+        <p:grpSpPr>
+          <a:xfrm rot="20525346">
+            <a:off x="3773751" y="1862233"/>
+            <a:ext cx="1556774" cy="715883"/>
+            <a:chOff x="1265237" y="5140362"/>
+            <a:chExt cx="2133300" cy="981000"/>
+          </a:xfrm>
+        </p:grpSpPr>
+        <p:sp>
+          <p:nvSpPr>
+            <p:cNvPr id="429" name="Shape 429"/>
+            <p:cNvSpPr/>
+            <p:nvPr/>
+          </p:nvSpPr>
+          <p:spPr>
+            <a:xfrm>
+              <a:off x="1265237" y="5402262"/>
+              <a:ext cx="457200" cy="457200"/>
+            </a:xfrm>
+            <a:prstGeom prst="ellipse">
+              <a:avLst/>
+            </a:prstGeom>
+            <a:noFill/>
+            <a:ln w="38100" cap="flat" cmpd="sng">
+              <a:solidFill>
+                <a:schemeClr val="dk1"/>
+              </a:solidFill>
+              <a:prstDash val="solid"/>
+              <a:round/>
+              <a:headEnd type="none" w="med" len="med"/>
+              <a:tailEnd type="none" w="med" len="med"/>
+            </a:ln>
+          </p:spPr>
+          <p:txBody>
+            <a:bodyPr lIns="182875" tIns="146300" rIns="182875" bIns="146300" anchor="t" anchorCtr="0">
+              <a:noAutofit/>
+            </a:bodyPr>
+            <a:lstStyle/>
+            <a:p>
+              <a:pPr marL="0" marR="0" lvl="0" indent="0" algn="ctr" rtl="0">
+                <a:lnSpc>
+                  <a:spcPct val="90000"/>
+                </a:lnSpc>
+                <a:spcBef>
+                  <a:spcPts val="0"/>
+                </a:spcBef>
+                <a:spcAft>
+                  <a:spcPts val="0"/>
+                </a:spcAft>
+                <a:buClr>
+                  <a:schemeClr val="lt1"/>
+                </a:buClr>
+                <a:buFont typeface="Arial"/>
+                <a:buNone/>
+              </a:pPr>
+              <a:endParaRPr sz="1800" b="0" i="0" u="none" strike="noStrike" cap="none">
+                <a:solidFill>
+                  <a:srgbClr val="FFFFFF"/>
+                </a:solidFill>
+                <a:latin typeface="Quattrocento Sans"/>
+                <a:ea typeface="Quattrocento Sans"/>
+                <a:cs typeface="Quattrocento Sans"/>
+                <a:sym typeface="Quattrocento Sans"/>
+              </a:endParaRPr>
+            </a:p>
+          </p:txBody>
+        </p:sp>
+        <p:cxnSp>
+          <p:nvCxnSpPr>
+            <p:cNvPr id="430" name="Shape 430"/>
+            <p:cNvCxnSpPr>
+              <a:stCxn id="429" idx="6"/>
+            </p:cNvCxnSpPr>
+            <p:nvPr/>
+          </p:nvCxnSpPr>
+          <p:spPr>
+            <a:xfrm rot="-9725392" flipH="1">
+              <a:off x="1762990" y="5373140"/>
+              <a:ext cx="1594993" cy="515442"/>
+            </a:xfrm>
+            <a:prstGeom prst="straightConnector1">
+              <a:avLst/>
+            </a:prstGeom>
+            <a:noFill/>
+            <a:ln w="38100" cap="flat" cmpd="sng">
+              <a:solidFill>
+                <a:schemeClr val="dk1"/>
+              </a:solidFill>
+              <a:prstDash val="solid"/>
+              <a:round/>
+              <a:headEnd type="none" w="med" len="med"/>
+              <a:tailEnd type="triangle" w="lg" len="lg"/>
+            </a:ln>
+          </p:spPr>
+        </p:cxnSp>
+      </p:grpSp>
+      <p:grpSp>
+        <p:nvGrpSpPr>
+          <p:cNvPr id="431" name="Shape 431"/>
+          <p:cNvGrpSpPr/>
+          <p:nvPr/>
+        </p:nvGrpSpPr>
+        <p:grpSpPr>
+          <a:xfrm rot="20525346">
+            <a:off x="5255285" y="1383399"/>
+            <a:ext cx="1556774" cy="715883"/>
+            <a:chOff x="1265237" y="5140362"/>
+            <a:chExt cx="2133300" cy="981000"/>
+          </a:xfrm>
+        </p:grpSpPr>
+        <p:sp>
+          <p:nvSpPr>
+            <p:cNvPr id="432" name="Shape 432"/>
+            <p:cNvSpPr/>
+            <p:nvPr/>
+          </p:nvSpPr>
+          <p:spPr>
+            <a:xfrm>
+              <a:off x="1265237" y="5402262"/>
+              <a:ext cx="457200" cy="457200"/>
+            </a:xfrm>
+            <a:prstGeom prst="ellipse">
+              <a:avLst/>
+            </a:prstGeom>
+            <a:noFill/>
+            <a:ln w="38100" cap="flat" cmpd="sng">
+              <a:solidFill>
+                <a:schemeClr val="dk1"/>
+              </a:solidFill>
+              <a:prstDash val="solid"/>
+              <a:round/>
+              <a:headEnd type="none" w="med" len="med"/>
+              <a:tailEnd type="none" w="med" len="med"/>
+            </a:ln>
+          </p:spPr>
+          <p:txBody>
+            <a:bodyPr lIns="182875" tIns="146300" rIns="182875" bIns="146300" anchor="t" anchorCtr="0">
+              <a:noAutofit/>
+            </a:bodyPr>
+            <a:lstStyle/>
+            <a:p>
+              <a:pPr marL="0" marR="0" lvl="0" indent="0" algn="ctr" rtl="0">
+                <a:lnSpc>
+                  <a:spcPct val="90000"/>
+                </a:lnSpc>
+                <a:spcBef>
+                  <a:spcPts val="0"/>
+                </a:spcBef>
+                <a:spcAft>
+                  <a:spcPts val="0"/>
+                </a:spcAft>
+                <a:buClr>
+                  <a:schemeClr val="lt1"/>
+                </a:buClr>
+                <a:buFont typeface="Arial"/>
+                <a:buNone/>
+              </a:pPr>
+              <a:endParaRPr sz="1800" b="0" i="0" u="none" strike="noStrike" cap="none">
+                <a:solidFill>
+                  <a:srgbClr val="FFFFFF"/>
+                </a:solidFill>
+                <a:latin typeface="Quattrocento Sans"/>
+                <a:ea typeface="Quattrocento Sans"/>
+                <a:cs typeface="Quattrocento Sans"/>
+                <a:sym typeface="Quattrocento Sans"/>
+              </a:endParaRPr>
+            </a:p>
+          </p:txBody>
+        </p:sp>
+        <p:cxnSp>
+          <p:nvCxnSpPr>
+            <p:cNvPr id="433" name="Shape 433"/>
+            <p:cNvCxnSpPr>
+              <a:stCxn id="432" idx="6"/>
+            </p:cNvCxnSpPr>
+            <p:nvPr/>
+          </p:nvCxnSpPr>
+          <p:spPr>
+            <a:xfrm rot="-9725392" flipH="1">
+              <a:off x="1762990" y="5373140"/>
+              <a:ext cx="1594993" cy="515442"/>
             </a:xfrm>
             <a:prstGeom prst="straightConnector1">
               <a:avLst/>
@@ -26801,7 +26760,7 @@
         </p:nvSpPr>
         <p:spPr>
           <a:xfrm>
-            <a:off x="6020094" y="948074"/>
+            <a:off x="4833845" y="1170497"/>
             <a:ext cx="1196700" cy="627900"/>
           </a:xfrm>
           <a:prstGeom prst="rect">
@@ -26858,7 +26817,7 @@
         </p:nvSpPr>
         <p:spPr>
           <a:xfrm>
-            <a:off x="1732405" y="2402035"/>
+            <a:off x="546156" y="2624458"/>
             <a:ext cx="770083" cy="627864"/>
           </a:xfrm>
           <a:prstGeom prst="rect">
@@ -26915,7 +26874,7 @@
         </p:nvSpPr>
         <p:spPr>
           <a:xfrm>
-            <a:off x="3213940" y="1923201"/>
+            <a:off x="2027691" y="2145624"/>
             <a:ext cx="770083" cy="627864"/>
           </a:xfrm>
           <a:prstGeom prst="rect">
@@ -26972,7 +26931,7 @@
         </p:nvSpPr>
         <p:spPr>
           <a:xfrm>
-            <a:off x="4731323" y="1447180"/>
+            <a:off x="3545074" y="1669603"/>
             <a:ext cx="770100" cy="627900"/>
           </a:xfrm>
           <a:prstGeom prst="rect">
@@ -27029,7 +26988,7 @@
         </p:nvSpPr>
         <p:spPr>
           <a:xfrm>
-            <a:off x="5668703" y="1910333"/>
+            <a:off x="4482454" y="2132756"/>
             <a:ext cx="2358658" cy="1702003"/>
           </a:xfrm>
           <a:prstGeom prst="rect">
@@ -27064,7 +27023,7 @@
               <a:buNone/>
             </a:pPr>
             <a:r>
-              <a:rPr lang="en-US" sz="1600" b="0" i="0" u="none" strike="noStrike" cap="none">
+              <a:rPr lang="en-US" sz="1600" b="0" i="0" u="none" strike="noStrike" cap="none" dirty="0">
                 <a:solidFill>
                   <a:srgbClr val="505050"/>
                 </a:solidFill>
@@ -27073,10 +27032,34 @@
                 <a:cs typeface="Quattrocento Sans"/>
                 <a:sym typeface="Quattrocento Sans"/>
               </a:rPr>
-              <a:t>Null-nullable types</a:t>
+              <a:t>Null-</a:t>
+            </a:r>
+            <a:r>
+              <a:rPr lang="en-US" sz="1600" b="0" i="0" u="none" strike="noStrike" cap="none" dirty="0" err="1">
+                <a:solidFill>
+                  <a:srgbClr val="505050"/>
+                </a:solidFill>
+                <a:latin typeface="Quattrocento Sans"/>
+                <a:ea typeface="Quattrocento Sans"/>
+                <a:cs typeface="Quattrocento Sans"/>
+                <a:sym typeface="Quattrocento Sans"/>
+              </a:rPr>
+              <a:t>nullable</a:t>
+            </a:r>
+            <a:r>
+              <a:rPr lang="en-US" sz="1600" b="0" i="0" u="none" strike="noStrike" cap="none" dirty="0">
+                <a:solidFill>
+                  <a:srgbClr val="505050"/>
+                </a:solidFill>
+                <a:latin typeface="Quattrocento Sans"/>
+                <a:ea typeface="Quattrocento Sans"/>
+                <a:cs typeface="Quattrocento Sans"/>
+                <a:sym typeface="Quattrocento Sans"/>
+              </a:rPr>
+              <a:t> types</a:t>
             </a:r>
             <a:br>
-              <a:rPr lang="en-US" sz="1600" b="0" i="0" u="none" strike="noStrike" cap="none">
+              <a:rPr lang="en-US" sz="1600" b="0" i="0" u="none" strike="noStrike" cap="none" dirty="0">
                 <a:solidFill>
                   <a:srgbClr val="505050"/>
                 </a:solidFill>
@@ -27087,7 +27070,7 @@
               </a:rPr>
             </a:br>
             <a:r>
-              <a:rPr lang="en-US" sz="1600" b="0" i="0" u="none" strike="noStrike" cap="none">
+              <a:rPr lang="en-US" sz="1600" b="0" i="0" u="none" strike="noStrike" cap="none" dirty="0">
                 <a:solidFill>
                   <a:srgbClr val="505050"/>
                 </a:solidFill>
@@ -27099,7 +27082,7 @@
               <a:t>Control flow analysis</a:t>
             </a:r>
             <a:br>
-              <a:rPr lang="en-US" sz="1600" b="0" i="0" u="none" strike="noStrike" cap="none">
+              <a:rPr lang="en-US" sz="1600" b="0" i="0" u="none" strike="noStrike" cap="none" dirty="0">
                 <a:solidFill>
                   <a:srgbClr val="505050"/>
                 </a:solidFill>
@@ -27110,7 +27093,7 @@
               </a:rPr>
             </a:br>
             <a:r>
-              <a:rPr lang="en-US" sz="1600" b="0" i="0" u="none" strike="noStrike" cap="none">
+              <a:rPr lang="en-US" sz="1600" b="0" i="0" u="none" strike="noStrike" cap="none" dirty="0" err="1">
                 <a:solidFill>
                   <a:srgbClr val="505050"/>
                 </a:solidFill>
@@ -27119,10 +27102,22 @@
                 <a:cs typeface="Quattrocento Sans"/>
                 <a:sym typeface="Quattrocento Sans"/>
               </a:rPr>
-              <a:t>Readonly properties</a:t>
+              <a:t>Readonly</a:t>
+            </a:r>
+            <a:r>
+              <a:rPr lang="en-US" sz="1600" b="0" i="0" u="none" strike="noStrike" cap="none" dirty="0">
+                <a:solidFill>
+                  <a:srgbClr val="505050"/>
+                </a:solidFill>
+                <a:latin typeface="Quattrocento Sans"/>
+                <a:ea typeface="Quattrocento Sans"/>
+                <a:cs typeface="Quattrocento Sans"/>
+                <a:sym typeface="Quattrocento Sans"/>
+              </a:rPr>
+              <a:t> properties</a:t>
             </a:r>
             <a:br>
-              <a:rPr lang="en-US" sz="1600" b="0" i="0" u="none" strike="noStrike" cap="none">
+              <a:rPr lang="en-US" sz="1600" b="0" i="0" u="none" strike="noStrike" cap="none" dirty="0">
                 <a:solidFill>
                   <a:srgbClr val="505050"/>
                 </a:solidFill>
@@ -27133,7 +27128,7 @@
               </a:rPr>
             </a:br>
             <a:r>
-              <a:rPr lang="en-US" sz="1600" b="0" i="0" u="none" strike="noStrike" cap="none">
+              <a:rPr lang="en-US" sz="1600" b="0" i="0" u="none" strike="noStrike" cap="none" dirty="0">
                 <a:solidFill>
                   <a:srgbClr val="505050"/>
                 </a:solidFill>
@@ -27145,7 +27140,7 @@
               <a:t>`this` type in functions</a:t>
             </a:r>
             <a:br>
-              <a:rPr lang="en-US" sz="1600" b="0" i="0" u="none" strike="noStrike" cap="none">
+              <a:rPr lang="en-US" sz="1600" b="0" i="0" u="none" strike="noStrike" cap="none" dirty="0">
                 <a:solidFill>
                   <a:srgbClr val="505050"/>
                 </a:solidFill>
@@ -27156,7 +27151,7 @@
               </a:rPr>
             </a:br>
             <a:r>
-              <a:rPr lang="en-US" sz="1600" b="0" i="0" u="none" strike="noStrike" cap="none">
+              <a:rPr lang="en-US" sz="1600" b="0" i="0" u="none" strike="noStrike" cap="none" dirty="0">
                 <a:solidFill>
                   <a:srgbClr val="505050"/>
                 </a:solidFill>
@@ -27187,7 +27182,7 @@
               <a:buNone/>
             </a:pPr>
             <a:r>
-              <a:rPr lang="en-US" sz="1600" b="0" i="0" u="none" strike="noStrike" cap="none">
+              <a:rPr lang="en-US" sz="1600" b="0" i="0" u="none" strike="noStrike" cap="none" dirty="0" smtClean="0">
                 <a:solidFill>
                   <a:srgbClr val="505050"/>
                 </a:solidFill>
@@ -27196,8 +27191,17 @@
                 <a:cs typeface="Quattrocento Sans"/>
                 <a:sym typeface="Quattrocento Sans"/>
               </a:rPr>
-              <a:t>…</a:t>
-            </a:r>
+              <a:t>…c</a:t>
+            </a:r>
+            <a:endParaRPr lang="en-US" sz="1600" b="0" i="0" u="none" strike="noStrike" cap="none" dirty="0">
+              <a:solidFill>
+                <a:srgbClr val="505050"/>
+              </a:solidFill>
+              <a:latin typeface="Quattrocento Sans"/>
+              <a:ea typeface="Quattrocento Sans"/>
+              <a:cs typeface="Quattrocento Sans"/>
+              <a:sym typeface="Quattrocento Sans"/>
+            </a:endParaRPr>
           </a:p>
         </p:txBody>
       </p:sp>
@@ -27209,7 +27213,7 @@
         </p:nvSpPr>
         <p:spPr>
           <a:xfrm>
-            <a:off x="1326908" y="3510687"/>
+            <a:off x="202443" y="3609541"/>
             <a:ext cx="1594026" cy="738664"/>
           </a:xfrm>
           <a:prstGeom prst="rect">
@@ -27289,7 +27293,7 @@
         </p:nvSpPr>
         <p:spPr>
           <a:xfrm>
-            <a:off x="2845249" y="3035342"/>
+            <a:off x="1659000" y="3257765"/>
             <a:ext cx="1507464" cy="1181862"/>
           </a:xfrm>
           <a:prstGeom prst="rect">
@@ -27415,7 +27419,7 @@
         </p:nvSpPr>
         <p:spPr>
           <a:xfrm>
-            <a:off x="4302487" y="2562825"/>
+            <a:off x="3116238" y="2785248"/>
             <a:ext cx="1556066" cy="1181862"/>
           </a:xfrm>
           <a:prstGeom prst="rect">
@@ -27595,6 +27599,371 @@
               <a:ea typeface="Arial"/>
               <a:cs typeface="Arial"/>
               <a:sym typeface="Arial"/>
+            </a:endParaRPr>
+          </a:p>
+        </p:txBody>
+      </p:sp>
+      <p:grpSp>
+        <p:nvGrpSpPr>
+          <p:cNvPr id="25" name="Shape 431"/>
+          <p:cNvGrpSpPr/>
+          <p:nvPr/>
+        </p:nvGrpSpPr>
+        <p:grpSpPr>
+          <a:xfrm rot="20525346">
+            <a:off x="6737321" y="889375"/>
+            <a:ext cx="1556774" cy="715883"/>
+            <a:chOff x="1265237" y="5140362"/>
+            <a:chExt cx="2133300" cy="981000"/>
+          </a:xfrm>
+        </p:grpSpPr>
+        <p:sp>
+          <p:nvSpPr>
+            <p:cNvPr id="26" name="Shape 432"/>
+            <p:cNvSpPr/>
+            <p:nvPr/>
+          </p:nvSpPr>
+          <p:spPr>
+            <a:xfrm>
+              <a:off x="1265237" y="5402262"/>
+              <a:ext cx="457200" cy="457200"/>
+            </a:xfrm>
+            <a:prstGeom prst="ellipse">
+              <a:avLst/>
+            </a:prstGeom>
+            <a:noFill/>
+            <a:ln w="38100" cap="flat" cmpd="sng">
+              <a:solidFill>
+                <a:schemeClr val="dk1"/>
+              </a:solidFill>
+              <a:prstDash val="solid"/>
+              <a:round/>
+              <a:headEnd type="none" w="med" len="med"/>
+              <a:tailEnd type="none" w="med" len="med"/>
+            </a:ln>
+          </p:spPr>
+          <p:txBody>
+            <a:bodyPr lIns="182875" tIns="146300" rIns="182875" bIns="146300" anchor="t" anchorCtr="0">
+              <a:noAutofit/>
+            </a:bodyPr>
+            <a:lstStyle/>
+            <a:p>
+              <a:pPr marL="0" marR="0" lvl="0" indent="0" algn="ctr" rtl="0">
+                <a:lnSpc>
+                  <a:spcPct val="90000"/>
+                </a:lnSpc>
+                <a:spcBef>
+                  <a:spcPts val="0"/>
+                </a:spcBef>
+                <a:spcAft>
+                  <a:spcPts val="0"/>
+                </a:spcAft>
+                <a:buClr>
+                  <a:schemeClr val="lt1"/>
+                </a:buClr>
+                <a:buFont typeface="Arial"/>
+                <a:buNone/>
+              </a:pPr>
+              <a:endParaRPr sz="1800" b="0" i="0" u="none" strike="noStrike" cap="none">
+                <a:solidFill>
+                  <a:srgbClr val="FFFFFF"/>
+                </a:solidFill>
+                <a:latin typeface="Quattrocento Sans"/>
+                <a:ea typeface="Quattrocento Sans"/>
+                <a:cs typeface="Quattrocento Sans"/>
+                <a:sym typeface="Quattrocento Sans"/>
+              </a:endParaRPr>
+            </a:p>
+          </p:txBody>
+        </p:sp>
+        <p:cxnSp>
+          <p:nvCxnSpPr>
+            <p:cNvPr id="27" name="Shape 433"/>
+            <p:cNvCxnSpPr/>
+            <p:nvPr/>
+          </p:nvCxnSpPr>
+          <p:spPr>
+            <a:xfrm rot="-9725392" flipH="1">
+              <a:off x="1762990" y="5373140"/>
+              <a:ext cx="1594993" cy="515442"/>
+            </a:xfrm>
+            <a:prstGeom prst="straightConnector1">
+              <a:avLst/>
+            </a:prstGeom>
+            <a:noFill/>
+            <a:ln w="38100" cap="flat" cmpd="sng">
+              <a:solidFill>
+                <a:schemeClr val="dk1"/>
+              </a:solidFill>
+              <a:prstDash val="solid"/>
+              <a:round/>
+              <a:headEnd type="none" w="med" len="med"/>
+              <a:tailEnd type="triangle" w="lg" len="lg"/>
+            </a:ln>
+          </p:spPr>
+        </p:cxnSp>
+      </p:grpSp>
+      <p:sp>
+        <p:nvSpPr>
+          <p:cNvPr id="28" name="Shape 435"/>
+          <p:cNvSpPr txBox="1"/>
+          <p:nvPr/>
+        </p:nvSpPr>
+        <p:spPr>
+          <a:xfrm>
+            <a:off x="6326269" y="734967"/>
+            <a:ext cx="1196700" cy="627900"/>
+          </a:xfrm>
+          <a:prstGeom prst="rect">
+            <a:avLst/>
+          </a:prstGeom>
+          <a:noFill/>
+          <a:ln>
+            <a:noFill/>
+          </a:ln>
+        </p:spPr>
+        <p:txBody>
+          <a:bodyPr lIns="182875" tIns="146300" rIns="182875" bIns="146300" anchor="t" anchorCtr="0">
+            <a:noAutofit/>
+          </a:bodyPr>
+          <a:lstStyle/>
+          <a:p>
+            <a:pPr marL="0" marR="0" lvl="0" indent="0" algn="ctr" rtl="0">
+              <a:lnSpc>
+                <a:spcPct val="90000"/>
+              </a:lnSpc>
+              <a:spcBef>
+                <a:spcPts val="0"/>
+              </a:spcBef>
+              <a:spcAft>
+                <a:spcPts val="0"/>
+              </a:spcAft>
+              <a:buClr>
+                <a:srgbClr val="0078D7"/>
+              </a:buClr>
+              <a:buSzPct val="25000"/>
+              <a:buFont typeface="Quattrocento Sans"/>
+              <a:buNone/>
+            </a:pPr>
+            <a:r>
+              <a:rPr lang="en-US" sz="2400" b="0" i="0" u="none" strike="noStrike" cap="none" dirty="0" smtClean="0">
+                <a:solidFill>
+                  <a:srgbClr val="00B050"/>
+                </a:solidFill>
+                <a:latin typeface="Quattrocento Sans"/>
+                <a:ea typeface="Quattrocento Sans"/>
+                <a:cs typeface="Quattrocento Sans"/>
+                <a:sym typeface="Quattrocento Sans"/>
+              </a:rPr>
+              <a:t>2.1</a:t>
+            </a:r>
+            <a:endParaRPr lang="en-US" sz="2400" b="0" i="0" u="none" strike="noStrike" cap="none" dirty="0">
+              <a:solidFill>
+                <a:srgbClr val="00B050"/>
+              </a:solidFill>
+              <a:latin typeface="Quattrocento Sans"/>
+              <a:ea typeface="Quattrocento Sans"/>
+              <a:cs typeface="Quattrocento Sans"/>
+              <a:sym typeface="Quattrocento Sans"/>
+            </a:endParaRPr>
+          </a:p>
+        </p:txBody>
+      </p:sp>
+      <p:sp>
+        <p:nvSpPr>
+          <p:cNvPr id="29" name="Shape 440"/>
+          <p:cNvSpPr txBox="1"/>
+          <p:nvPr/>
+        </p:nvSpPr>
+        <p:spPr>
+          <a:xfrm>
+            <a:off x="6211377" y="1562480"/>
+            <a:ext cx="2623703" cy="1593401"/>
+          </a:xfrm>
+          <a:prstGeom prst="rect">
+            <a:avLst/>
+          </a:prstGeom>
+          <a:noFill/>
+          <a:ln>
+            <a:noFill/>
+          </a:ln>
+        </p:spPr>
+        <p:txBody>
+          <a:bodyPr lIns="182875" tIns="146300" rIns="182875" bIns="146300" anchor="t" anchorCtr="0">
+            <a:noAutofit/>
+          </a:bodyPr>
+          <a:lstStyle/>
+          <a:p>
+            <a:pPr marL="0" marR="0" lvl="0" indent="0" algn="ctr" rtl="0">
+              <a:lnSpc>
+                <a:spcPct val="90000"/>
+              </a:lnSpc>
+              <a:spcBef>
+                <a:spcPts val="0"/>
+              </a:spcBef>
+              <a:spcAft>
+                <a:spcPts val="0"/>
+              </a:spcAft>
+              <a:buClr>
+                <a:srgbClr val="505050"/>
+              </a:buClr>
+              <a:buSzPct val="25000"/>
+              <a:buFont typeface="Quattrocento Sans"/>
+              <a:buNone/>
+            </a:pPr>
+            <a:r>
+              <a:rPr lang="en-US" sz="1600" dirty="0" err="1" smtClean="0">
+                <a:solidFill>
+                  <a:srgbClr val="505050"/>
+                </a:solidFill>
+                <a:latin typeface="Quattrocento Sans"/>
+                <a:ea typeface="Quattrocento Sans"/>
+                <a:cs typeface="Quattrocento Sans"/>
+                <a:sym typeface="Quattrocento Sans"/>
+              </a:rPr>
+              <a:t>Downlevel</a:t>
+            </a:r>
+            <a:r>
+              <a:rPr lang="en-US" sz="1600" dirty="0" smtClean="0">
+                <a:solidFill>
+                  <a:srgbClr val="505050"/>
+                </a:solidFill>
+                <a:latin typeface="Quattrocento Sans"/>
+                <a:ea typeface="Quattrocento Sans"/>
+                <a:cs typeface="Quattrocento Sans"/>
+                <a:sym typeface="Quattrocento Sans"/>
+              </a:rPr>
+              <a:t> </a:t>
+            </a:r>
+            <a:r>
+              <a:rPr lang="en-US" sz="1600" dirty="0" err="1" smtClean="0">
+                <a:solidFill>
+                  <a:srgbClr val="505050"/>
+                </a:solidFill>
+                <a:latin typeface="Quattrocento Sans"/>
+                <a:ea typeface="Quattrocento Sans"/>
+                <a:cs typeface="Quattrocento Sans"/>
+                <a:sym typeface="Quattrocento Sans"/>
+              </a:rPr>
+              <a:t>Async</a:t>
+            </a:r>
+            <a:r>
+              <a:rPr lang="en-US" sz="1600" dirty="0" smtClean="0">
+                <a:solidFill>
+                  <a:srgbClr val="505050"/>
+                </a:solidFill>
+                <a:latin typeface="Quattrocento Sans"/>
+                <a:ea typeface="Quattrocento Sans"/>
+                <a:cs typeface="Quattrocento Sans"/>
+                <a:sym typeface="Quattrocento Sans"/>
+              </a:rPr>
+              <a:t> / Await</a:t>
+            </a:r>
+            <a:r>
+              <a:rPr lang="en-US" sz="1600" b="0" i="0" u="none" strike="noStrike" cap="none" dirty="0">
+                <a:solidFill>
+                  <a:srgbClr val="505050"/>
+                </a:solidFill>
+                <a:latin typeface="Quattrocento Sans"/>
+                <a:ea typeface="Quattrocento Sans"/>
+                <a:cs typeface="Quattrocento Sans"/>
+                <a:sym typeface="Quattrocento Sans"/>
+              </a:rPr>
+              <a:t/>
+            </a:r>
+            <a:br>
+              <a:rPr lang="en-US" sz="1600" b="0" i="0" u="none" strike="noStrike" cap="none" dirty="0">
+                <a:solidFill>
+                  <a:srgbClr val="505050"/>
+                </a:solidFill>
+                <a:latin typeface="Quattrocento Sans"/>
+                <a:ea typeface="Quattrocento Sans"/>
+                <a:cs typeface="Quattrocento Sans"/>
+                <a:sym typeface="Quattrocento Sans"/>
+              </a:rPr>
+            </a:br>
+            <a:r>
+              <a:rPr lang="en-US" sz="1600" b="0" i="0" u="none" strike="noStrike" cap="none" dirty="0" smtClean="0">
+                <a:solidFill>
+                  <a:srgbClr val="505050"/>
+                </a:solidFill>
+                <a:latin typeface="Quattrocento Sans"/>
+                <a:ea typeface="Quattrocento Sans"/>
+                <a:cs typeface="Quattrocento Sans"/>
+                <a:sym typeface="Quattrocento Sans"/>
+              </a:rPr>
+              <a:t>Mapped Types</a:t>
+            </a:r>
+          </a:p>
+          <a:p>
+            <a:pPr marL="0" marR="0" lvl="0" indent="0" algn="ctr" rtl="0">
+              <a:lnSpc>
+                <a:spcPct val="90000"/>
+              </a:lnSpc>
+              <a:spcBef>
+                <a:spcPts val="0"/>
+              </a:spcBef>
+              <a:spcAft>
+                <a:spcPts val="0"/>
+              </a:spcAft>
+              <a:buClr>
+                <a:srgbClr val="505050"/>
+              </a:buClr>
+              <a:buSzPct val="25000"/>
+              <a:buFont typeface="Quattrocento Sans"/>
+              <a:buNone/>
+            </a:pPr>
+            <a:r>
+              <a:rPr lang="en-US" sz="1600" dirty="0" smtClean="0">
+                <a:solidFill>
+                  <a:srgbClr val="505050"/>
+                </a:solidFill>
+                <a:latin typeface="Quattrocento Sans"/>
+                <a:ea typeface="Quattrocento Sans"/>
+                <a:cs typeface="Quattrocento Sans"/>
+                <a:sym typeface="Quattrocento Sans"/>
+              </a:rPr>
+              <a:t>Object spread</a:t>
+            </a:r>
+          </a:p>
+          <a:p>
+            <a:pPr marL="0" marR="0" lvl="0" indent="0" algn="ctr" rtl="0">
+              <a:lnSpc>
+                <a:spcPct val="90000"/>
+              </a:lnSpc>
+              <a:spcBef>
+                <a:spcPts val="0"/>
+              </a:spcBef>
+              <a:spcAft>
+                <a:spcPts val="0"/>
+              </a:spcAft>
+              <a:buClr>
+                <a:srgbClr val="505050"/>
+              </a:buClr>
+              <a:buSzPct val="25000"/>
+              <a:buFont typeface="Quattrocento Sans"/>
+              <a:buNone/>
+            </a:pPr>
+            <a:r>
+              <a:rPr lang="is-IS" sz="1600" b="0" i="0" u="none" strike="noStrike" cap="none" dirty="0" smtClean="0">
+                <a:solidFill>
+                  <a:srgbClr val="505050"/>
+                </a:solidFill>
+                <a:latin typeface="Quattrocento Sans"/>
+                <a:ea typeface="Quattrocento Sans"/>
+                <a:cs typeface="Quattrocento Sans"/>
+                <a:sym typeface="Quattrocento Sans"/>
+              </a:rPr>
+              <a:t>…</a:t>
+            </a:r>
+            <a:endParaRPr lang="en-US" sz="1600" b="0" i="0" u="none" strike="noStrike" cap="none" dirty="0">
+              <a:solidFill>
+                <a:srgbClr val="505050"/>
+              </a:solidFill>
+              <a:latin typeface="Quattrocento Sans"/>
+              <a:ea typeface="Quattrocento Sans"/>
+              <a:cs typeface="Quattrocento Sans"/>
+              <a:sym typeface="Quattrocento Sans"/>
             </a:endParaRPr>
           </a:p>
         </p:txBody>

</xml_diff>